<commit_message>
Re-pushing just to make sure
</commit_message>
<xml_diff>
--- a/Tutorial/Code Learning-Ryanda.pptx
+++ b/Tutorial/Code Learning-Ryanda.pptx
@@ -18031,7 +18031,7 @@
         <p:spPr>
           <a:xfrm>
             <a:off x="612607" y="1665652"/>
-            <a:ext cx="5495610" cy="5355312"/>
+            <a:ext cx="5818010" cy="5355312"/>
           </a:xfrm>
           <a:prstGeom prst="rect">
             <a:avLst/>
@@ -18111,7 +18111,7 @@
               <a:rPr lang="en-US" dirty="0">
                 <a:latin typeface="Calibri (Body)"/>
               </a:rPr>
-              <a:t>for pairing.csv</a:t>
+              <a:t>for pairing.csv 	: contain data pairing purpose</a:t>
             </a:r>
           </a:p>
           <a:p>
@@ -18123,7 +18123,7 @@
               <a:rPr lang="en-US" dirty="0">
                 <a:latin typeface="Calibri (Body)"/>
               </a:rPr>
-              <a:t>orders.csv</a:t>
+              <a:t>orders.csv	: contain order data</a:t>
             </a:r>
           </a:p>
           <a:p>
@@ -18135,7 +18135,7 @@
               <a:rPr lang="en-US" dirty="0">
                 <a:latin typeface="Calibri (Body)"/>
               </a:rPr>
-              <a:t>item in pod.csv</a:t>
+              <a:t>item in pod.csv	: contain list of item in pod data</a:t>
             </a:r>
           </a:p>
           <a:p>
@@ -18147,7 +18147,7 @@
               <a:rPr lang="en-US" dirty="0">
                 <a:latin typeface="Calibri (Body)"/>
               </a:rPr>
-              <a:t>Assigned_order_to_pod.csv</a:t>
+              <a:t>Assigned_order_to_pod.csv : contain order that assigned to the pod data</a:t>
             </a:r>
           </a:p>
           <a:p>
@@ -18159,7 +18159,7 @@
               <a:rPr lang="en-US" dirty="0">
                 <a:latin typeface="Calibri (Body)"/>
               </a:rPr>
-              <a:t>robot cycle time.csv</a:t>
+              <a:t>robot cycle time.csv : contain robot cycle time data</a:t>
             </a:r>
           </a:p>
           <a:p>
@@ -18171,7 +18171,7 @@
               <a:rPr lang="en-US" dirty="0">
                 <a:latin typeface="Calibri (Body)"/>
               </a:rPr>
-              <a:t>throughput rate.csv</a:t>
+              <a:t>throughput rate.csv : contain throughput rate data</a:t>
             </a:r>
           </a:p>
           <a:p>
@@ -18183,7 +18183,7 @@
               <a:rPr lang="en-US" dirty="0">
                 <a:latin typeface="Calibri (Body)"/>
               </a:rPr>
-              <a:t>order cycle time.csv</a:t>
+              <a:t>order cycle time.csv : contain order cycle time data</a:t>
             </a:r>
           </a:p>
           <a:p>
@@ -18195,7 +18195,13 @@
               <a:rPr lang="en-US" dirty="0">
                 <a:latin typeface="Calibri (Body)"/>
               </a:rPr>
-              <a:t>stop and go.csv</a:t>
+              <a:t>stop and go.csv	</a:t>
+            </a:r>
+            <a:r>
+              <a:rPr lang="en-US">
+                <a:latin typeface="Calibri (Body)"/>
+              </a:rPr>
+              <a:t>: contain ticks data</a:t>
             </a:r>
             <a:br>
               <a:rPr lang="en-US" dirty="0"/>

</xml_diff>